<commit_message>
tweaks and add some example code
</commit_message>
<xml_diff>
--- a/TerraformAntiPatterns/SNAKES.EVERYWHERE.pptx
+++ b/TerraformAntiPatterns/SNAKES.EVERYWHERE.pptx
@@ -5,7 +5,7 @@
     <p:sldMasterId id="2147483648" r:id="rId1"/>
   </p:sldMasterIdLst>
   <p:notesMasterIdLst>
-    <p:notesMasterId r:id="rId11"/>
+    <p:notesMasterId r:id="rId12"/>
   </p:notesMasterIdLst>
   <p:sldIdLst>
     <p:sldId id="256" r:id="rId2"/>
@@ -17,6 +17,7 @@
     <p:sldId id="262" r:id="rId8"/>
     <p:sldId id="263" r:id="rId9"/>
     <p:sldId id="264" r:id="rId10"/>
+    <p:sldId id="265" r:id="rId11"/>
   </p:sldIdLst>
   <p:sldSz cx="12192000" cy="6858000"/>
   <p:notesSz cx="6858000" cy="9144000"/>
@@ -205,7 +206,7 @@
           <a:p>
             <a:fld id="{13DBAEA8-5116-4045-8958-1121E927E125}" type="datetimeFigureOut">
               <a:rPr lang="en-US" smtClean="0"/>
-              <a:t>6/3/22</a:t>
+              <a:t>7/11/2022</a:t>
             </a:fld>
             <a:endParaRPr lang="en-US"/>
           </a:p>
@@ -613,6 +614,90 @@
 </p:notes>
 </file>
 
+<file path=ppt/notesSlides/notesSlide10.xml><?xml version="1.0" encoding="utf-8"?>
+<p:notes xmlns:a="http://schemas.openxmlformats.org/drawingml/2006/main" xmlns:r="http://schemas.openxmlformats.org/officeDocument/2006/relationships" xmlns:p="http://schemas.openxmlformats.org/presentationml/2006/main">
+  <p:cSld>
+    <p:spTree>
+      <p:nvGrpSpPr>
+        <p:cNvPr id="1" name=""/>
+        <p:cNvGrpSpPr/>
+        <p:nvPr/>
+      </p:nvGrpSpPr>
+      <p:grpSpPr>
+        <a:xfrm>
+          <a:off x="0" y="0"/>
+          <a:ext cx="0" cy="0"/>
+          <a:chOff x="0" y="0"/>
+          <a:chExt cx="0" cy="0"/>
+        </a:xfrm>
+      </p:grpSpPr>
+      <p:sp>
+        <p:nvSpPr>
+          <p:cNvPr id="2" name="Slide Image Placeholder 1"/>
+          <p:cNvSpPr>
+            <a:spLocks noGrp="1" noRot="1" noChangeAspect="1"/>
+          </p:cNvSpPr>
+          <p:nvPr>
+            <p:ph type="sldImg"/>
+          </p:nvPr>
+        </p:nvSpPr>
+        <p:spPr/>
+      </p:sp>
+      <p:sp>
+        <p:nvSpPr>
+          <p:cNvPr id="3" name="Notes Placeholder 2"/>
+          <p:cNvSpPr>
+            <a:spLocks noGrp="1"/>
+          </p:cNvSpPr>
+          <p:nvPr>
+            <p:ph type="body" idx="1"/>
+          </p:nvPr>
+        </p:nvSpPr>
+        <p:spPr/>
+        <p:txBody>
+          <a:bodyPr/>
+          <a:lstStyle/>
+          <a:p>
+            <a:endParaRPr lang="en-AU" dirty="0"/>
+          </a:p>
+        </p:txBody>
+      </p:sp>
+      <p:sp>
+        <p:nvSpPr>
+          <p:cNvPr id="4" name="Slide Number Placeholder 3"/>
+          <p:cNvSpPr>
+            <a:spLocks noGrp="1"/>
+          </p:cNvSpPr>
+          <p:nvPr>
+            <p:ph type="sldNum" sz="quarter" idx="5"/>
+          </p:nvPr>
+        </p:nvSpPr>
+        <p:spPr/>
+        <p:txBody>
+          <a:bodyPr/>
+          <a:lstStyle/>
+          <a:p>
+            <a:fld id="{BCB4D1F3-794F-234E-BB7A-00B57ADC5ACE}" type="slidenum">
+              <a:rPr lang="en-US" smtClean="0"/>
+              <a:t>10</a:t>
+            </a:fld>
+            <a:endParaRPr lang="en-US"/>
+          </a:p>
+        </p:txBody>
+      </p:sp>
+    </p:spTree>
+    <p:extLst>
+      <p:ext uri="{BB962C8B-B14F-4D97-AF65-F5344CB8AC3E}">
+        <p14:creationId xmlns:p14="http://schemas.microsoft.com/office/powerpoint/2010/main" val="917582375"/>
+      </p:ext>
+    </p:extLst>
+  </p:cSld>
+  <p:clrMapOvr>
+    <a:masterClrMapping/>
+  </p:clrMapOvr>
+</p:notes>
+</file>
+
 <file path=ppt/notesSlides/notesSlide2.xml><?xml version="1.0" encoding="utf-8"?>
 <p:notes xmlns:a="http://schemas.openxmlformats.org/drawingml/2006/main" xmlns:r="http://schemas.openxmlformats.org/officeDocument/2006/relationships" xmlns:p="http://schemas.openxmlformats.org/presentationml/2006/main">
   <p:cSld>
@@ -1405,109 +1490,7 @@
           <a:bodyPr/>
           <a:lstStyle/>
           <a:p>
-            <a:r>
-              <a:rPr lang="en-US" dirty="0"/>
-              <a:t>FIRE and FORGET.</a:t>
-            </a:r>
-            <a:br>
-              <a:rPr lang="en-US" dirty="0"/>
-            </a:br>
-            <a:br>
-              <a:rPr lang="en-US" dirty="0"/>
-            </a:br>
-            <a:r>
-              <a:rPr lang="en-US" dirty="0"/>
-              <a:t>That is, folks who write up a bunch of terraform, or maybe copy and paste it from a website, run it once to set up the infrastructure…. Then do nothing else with it.</a:t>
-            </a:r>
-            <a:br>
-              <a:rPr lang="en-US" dirty="0"/>
-            </a:br>
-            <a:br>
-              <a:rPr lang="en-US" dirty="0"/>
-            </a:br>
-            <a:r>
-              <a:rPr lang="en-US" dirty="0"/>
-              <a:t>The biggest strength of Terraform is in Drift detection and Correction – if you’re not running it over and over, you don’t get that strength.</a:t>
-            </a:r>
-            <a:br>
-              <a:rPr lang="en-US" dirty="0"/>
-            </a:br>
-            <a:br>
-              <a:rPr lang="en-US" dirty="0"/>
-            </a:br>
-            <a:r>
-              <a:rPr lang="en-US" dirty="0"/>
-              <a:t>And what does this have to do with snakes?</a:t>
-            </a:r>
-            <a:br>
-              <a:rPr lang="en-US" dirty="0"/>
-            </a:br>
-            <a:br>
-              <a:rPr lang="en-US" dirty="0"/>
-            </a:br>
-            <a:r>
-              <a:rPr lang="en-US" dirty="0"/>
-              <a:t>I lived in the country for a few years, up in NE Victoria. I had a big old lawn front and back, and I was fairly lazy in mowing it. In fact, I don’t think I mowed it at all for the first few months. After a while, a mate at the pub asked me why I hadn’t mowed my lawn lately. I attempted to explain that I wasn’t really bothered, it was nice to leave it a bit natural and besides, I’m lazy.</a:t>
-            </a:r>
-            <a:br>
-              <a:rPr lang="en-US" dirty="0"/>
-            </a:br>
-            <a:br>
-              <a:rPr lang="en-US" dirty="0"/>
-            </a:br>
-            <a:r>
-              <a:rPr lang="en-US" dirty="0"/>
-              <a:t>He replied “So… you want snakes? Because that’s how you get snakes”.</a:t>
-            </a:r>
-            <a:br>
-              <a:rPr lang="en-US" dirty="0"/>
-            </a:br>
-            <a:br>
-              <a:rPr lang="en-US" dirty="0"/>
-            </a:br>
-            <a:r>
-              <a:rPr lang="en-US" dirty="0"/>
-              <a:t>Which was a surprise. I – city kid – hadn’t thought about that at all.</a:t>
-            </a:r>
-          </a:p>
-          <a:p>
             <a:endParaRPr lang="en-US" dirty="0"/>
-          </a:p>
-          <a:p>
-            <a:r>
-              <a:rPr lang="en-US" dirty="0"/>
-              <a:t>If you don’t mow your lawn regularly when you’re out in the country, you’re creating a lovely environment in which small critters can roam around unseen, and where there are small critters, there are predators. Snakes will arrive. And it’s the same with terraform. You need to run it regularly to check and correct your infrastructure, otherwise small changes will creep in, and where small changes multiply, eventually bigger and worse ones will arrive.</a:t>
-            </a:r>
-            <a:br>
-              <a:rPr lang="en-US" dirty="0"/>
-            </a:br>
-            <a:br>
-              <a:rPr lang="en-US" dirty="0"/>
-            </a:br>
-            <a:r>
-              <a:rPr lang="en-US" dirty="0"/>
-              <a:t>Sure enough, one morning a few weeks after that conversation, I stepped out my front door to find a 3ft red-belly sunning on my driveway.</a:t>
-            </a:r>
-            <a:br>
-              <a:rPr lang="en-US" dirty="0"/>
-            </a:br>
-            <a:br>
-              <a:rPr lang="en-US" dirty="0"/>
-            </a:br>
-            <a:r>
-              <a:rPr lang="en-US" dirty="0"/>
-              <a:t>Shortly after, I bought a lawnmower. No more snakes.</a:t>
-            </a:r>
-            <a:br>
-              <a:rPr lang="en-US" dirty="0"/>
-            </a:br>
-            <a:br>
-              <a:rPr lang="en-US" dirty="0"/>
-            </a:br>
-            <a:r>
-              <a:rPr lang="en-US" dirty="0"/>
-              <a:t>So that’s Antipattern #1, and I hope nobody here is doing that.</a:t>
-            </a:r>
           </a:p>
         </p:txBody>
       </p:sp>
@@ -1798,7 +1781,40 @@
           <a:bodyPr/>
           <a:lstStyle/>
           <a:p>
-            <a:endParaRPr lang="en-US" dirty="0"/>
+            <a:pPr marL="0" marR="0" lvl="0" indent="0" algn="l" defTabSz="914400" rtl="0" eaLnBrk="1" fontAlgn="auto" latinLnBrk="0" hangingPunct="1">
+              <a:lnSpc>
+                <a:spcPct val="100000"/>
+              </a:lnSpc>
+              <a:spcBef>
+                <a:spcPts val="0"/>
+              </a:spcBef>
+              <a:spcAft>
+                <a:spcPts val="0"/>
+              </a:spcAft>
+              <a:buClrTx/>
+              <a:buSzTx/>
+              <a:buFontTx/>
+              <a:buNone/>
+              <a:tabLst/>
+              <a:defRPr/>
+            </a:pPr>
+            <a:r>
+              <a:rPr lang="en-US" dirty="0"/>
+              <a:t>Chevrons to failure?</a:t>
+            </a:r>
+            <a:br>
+              <a:rPr lang="en-US" dirty="0"/>
+            </a:br>
+            <a:r>
+              <a:rPr lang="en-US" dirty="0"/>
+              <a:t>Wrapper scripts in place of workspaces?</a:t>
+            </a:r>
+          </a:p>
+          <a:p>
+            <a:r>
+              <a:rPr lang="en-US" dirty="0"/>
+              <a:t>Hardcoded variables instead of resource references?</a:t>
+            </a:r>
           </a:p>
         </p:txBody>
       </p:sp>
@@ -1987,7 +2003,7 @@
           <a:p>
             <a:fld id="{ED6B0BDF-F4C0-41F9-9E4F-DF13D40EA9FA}" type="datetimeFigureOut">
               <a:rPr lang="en-AU" smtClean="0"/>
-              <a:t>3/6/2022</a:t>
+              <a:t>11/07/2022</a:t>
             </a:fld>
             <a:endParaRPr lang="en-AU"/>
           </a:p>
@@ -2187,7 +2203,7 @@
           <a:p>
             <a:fld id="{ED6B0BDF-F4C0-41F9-9E4F-DF13D40EA9FA}" type="datetimeFigureOut">
               <a:rPr lang="en-AU" smtClean="0"/>
-              <a:t>3/6/2022</a:t>
+              <a:t>11/07/2022</a:t>
             </a:fld>
             <a:endParaRPr lang="en-AU"/>
           </a:p>
@@ -2397,7 +2413,7 @@
           <a:p>
             <a:fld id="{ED6B0BDF-F4C0-41F9-9E4F-DF13D40EA9FA}" type="datetimeFigureOut">
               <a:rPr lang="en-AU" smtClean="0"/>
-              <a:t>3/6/2022</a:t>
+              <a:t>11/07/2022</a:t>
             </a:fld>
             <a:endParaRPr lang="en-AU"/>
           </a:p>
@@ -2597,7 +2613,7 @@
           <a:p>
             <a:fld id="{ED6B0BDF-F4C0-41F9-9E4F-DF13D40EA9FA}" type="datetimeFigureOut">
               <a:rPr lang="en-AU" smtClean="0"/>
-              <a:t>3/6/2022</a:t>
+              <a:t>11/07/2022</a:t>
             </a:fld>
             <a:endParaRPr lang="en-AU"/>
           </a:p>
@@ -2873,7 +2889,7 @@
           <a:p>
             <a:fld id="{ED6B0BDF-F4C0-41F9-9E4F-DF13D40EA9FA}" type="datetimeFigureOut">
               <a:rPr lang="en-AU" smtClean="0"/>
-              <a:t>3/6/2022</a:t>
+              <a:t>11/07/2022</a:t>
             </a:fld>
             <a:endParaRPr lang="en-AU"/>
           </a:p>
@@ -3141,7 +3157,7 @@
           <a:p>
             <a:fld id="{ED6B0BDF-F4C0-41F9-9E4F-DF13D40EA9FA}" type="datetimeFigureOut">
               <a:rPr lang="en-AU" smtClean="0"/>
-              <a:t>3/6/2022</a:t>
+              <a:t>11/07/2022</a:t>
             </a:fld>
             <a:endParaRPr lang="en-AU"/>
           </a:p>
@@ -3556,7 +3572,7 @@
           <a:p>
             <a:fld id="{ED6B0BDF-F4C0-41F9-9E4F-DF13D40EA9FA}" type="datetimeFigureOut">
               <a:rPr lang="en-AU" smtClean="0"/>
-              <a:t>3/6/2022</a:t>
+              <a:t>11/07/2022</a:t>
             </a:fld>
             <a:endParaRPr lang="en-AU"/>
           </a:p>
@@ -3698,7 +3714,7 @@
           <a:p>
             <a:fld id="{ED6B0BDF-F4C0-41F9-9E4F-DF13D40EA9FA}" type="datetimeFigureOut">
               <a:rPr lang="en-AU" smtClean="0"/>
-              <a:t>3/6/2022</a:t>
+              <a:t>11/07/2022</a:t>
             </a:fld>
             <a:endParaRPr lang="en-AU"/>
           </a:p>
@@ -3811,7 +3827,7 @@
           <a:p>
             <a:fld id="{ED6B0BDF-F4C0-41F9-9E4F-DF13D40EA9FA}" type="datetimeFigureOut">
               <a:rPr lang="en-AU" smtClean="0"/>
-              <a:t>3/6/2022</a:t>
+              <a:t>11/07/2022</a:t>
             </a:fld>
             <a:endParaRPr lang="en-AU"/>
           </a:p>
@@ -4124,7 +4140,7 @@
           <a:p>
             <a:fld id="{ED6B0BDF-F4C0-41F9-9E4F-DF13D40EA9FA}" type="datetimeFigureOut">
               <a:rPr lang="en-AU" smtClean="0"/>
-              <a:t>3/6/2022</a:t>
+              <a:t>11/07/2022</a:t>
             </a:fld>
             <a:endParaRPr lang="en-AU"/>
           </a:p>
@@ -4413,7 +4429,7 @@
           <a:p>
             <a:fld id="{ED6B0BDF-F4C0-41F9-9E4F-DF13D40EA9FA}" type="datetimeFigureOut">
               <a:rPr lang="en-AU" smtClean="0"/>
-              <a:t>3/6/2022</a:t>
+              <a:t>11/07/2022</a:t>
             </a:fld>
             <a:endParaRPr lang="en-AU"/>
           </a:p>
@@ -4656,7 +4672,7 @@
           <a:p>
             <a:fld id="{ED6B0BDF-F4C0-41F9-9E4F-DF13D40EA9FA}" type="datetimeFigureOut">
               <a:rPr lang="en-AU" smtClean="0"/>
-              <a:t>3/6/2022</a:t>
+              <a:t>11/07/2022</a:t>
             </a:fld>
             <a:endParaRPr lang="en-AU"/>
           </a:p>
@@ -5281,6 +5297,86 @@
   </p:cSld>
   <p:clrMapOvr>
     <a:overrideClrMapping bg1="dk1" tx1="lt1" bg2="dk2" tx2="lt2" accent1="accent1" accent2="accent2" accent3="accent3" accent4="accent4" accent5="accent5" accent6="accent6" hlink="hlink" folHlink="folHlink"/>
+  </p:clrMapOvr>
+</p:sld>
+</file>
+
+<file path=ppt/slides/slide10.xml><?xml version="1.0" encoding="utf-8"?>
+<p:sld xmlns:a="http://schemas.openxmlformats.org/drawingml/2006/main" xmlns:r="http://schemas.openxmlformats.org/officeDocument/2006/relationships" xmlns:p="http://schemas.openxmlformats.org/presentationml/2006/main">
+  <p:cSld>
+    <p:spTree>
+      <p:nvGrpSpPr>
+        <p:cNvPr id="1" name=""/>
+        <p:cNvGrpSpPr/>
+        <p:nvPr/>
+      </p:nvGrpSpPr>
+      <p:grpSpPr>
+        <a:xfrm>
+          <a:off x="0" y="0"/>
+          <a:ext cx="0" cy="0"/>
+          <a:chOff x="0" y="0"/>
+          <a:chExt cx="0" cy="0"/>
+        </a:xfrm>
+      </p:grpSpPr>
+      <p:sp>
+        <p:nvSpPr>
+          <p:cNvPr id="2" name="Title 1">
+            <a:extLst>
+              <a:ext uri="{FF2B5EF4-FFF2-40B4-BE49-F238E27FC236}">
+                <a16:creationId xmlns:a16="http://schemas.microsoft.com/office/drawing/2014/main" id="{F337C364-A7F3-C535-5FB6-1DA403564102}"/>
+              </a:ext>
+            </a:extLst>
+          </p:cNvPr>
+          <p:cNvSpPr>
+            <a:spLocks noGrp="1"/>
+          </p:cNvSpPr>
+          <p:nvPr>
+            <p:ph type="title"/>
+          </p:nvPr>
+        </p:nvSpPr>
+        <p:spPr/>
+        <p:txBody>
+          <a:bodyPr/>
+          <a:lstStyle/>
+          <a:p>
+            <a:endParaRPr lang="en-AU"/>
+          </a:p>
+        </p:txBody>
+      </p:sp>
+      <p:sp>
+        <p:nvSpPr>
+          <p:cNvPr id="3" name="Content Placeholder 2">
+            <a:extLst>
+              <a:ext uri="{FF2B5EF4-FFF2-40B4-BE49-F238E27FC236}">
+                <a16:creationId xmlns:a16="http://schemas.microsoft.com/office/drawing/2014/main" id="{BED66EB5-34D1-F613-9F33-C23FF80067B7}"/>
+              </a:ext>
+            </a:extLst>
+          </p:cNvPr>
+          <p:cNvSpPr>
+            <a:spLocks noGrp="1"/>
+          </p:cNvSpPr>
+          <p:nvPr>
+            <p:ph idx="1"/>
+          </p:nvPr>
+        </p:nvSpPr>
+        <p:spPr/>
+        <p:txBody>
+          <a:bodyPr/>
+          <a:lstStyle/>
+          <a:p>
+            <a:endParaRPr lang="en-AU"/>
+          </a:p>
+        </p:txBody>
+      </p:sp>
+    </p:spTree>
+    <p:extLst>
+      <p:ext uri="{BB962C8B-B14F-4D97-AF65-F5344CB8AC3E}">
+        <p14:creationId xmlns:p14="http://schemas.microsoft.com/office/powerpoint/2010/main" val="3357497386"/>
+      </p:ext>
+    </p:extLst>
+  </p:cSld>
+  <p:clrMapOvr>
+    <a:masterClrMapping/>
   </p:clrMapOvr>
 </p:sld>
 </file>

</xml_diff>